<commit_message>
Yay, works everything but Stack (RAM probably)
</commit_message>
<xml_diff>
--- a/Engine test/PPVerilogEngine/main.pptx
+++ b/Engine test/PPVerilogEngine/main.pptx
@@ -3467,8 +3467,8 @@
         </p:nvSpPr>
         <p:spPr>
           <a:xfrm>
-            <a:off x="178677" y="2722116"/>
-            <a:ext cx="1862560" cy="982697"/>
+            <a:off x="178677" y="818606"/>
+            <a:ext cx="6213414" cy="2886207"/>
           </a:xfrm>
           <a:prstGeom prst="rect">
             <a:avLst/>
@@ -3583,8 +3583,8 @@
         </p:blipFill>
         <p:spPr>
           <a:xfrm>
-            <a:off x="3457812" y="3298734"/>
-            <a:ext cx="2236406" cy="2236406"/>
+            <a:off x="4041286" y="4152174"/>
+            <a:ext cx="736604" cy="736604"/>
           </a:xfrm>
           <a:prstGeom prst="rect">
             <a:avLst/>
@@ -3657,82 +3657,6 @@
           </a:prstGeom>
         </p:spPr>
       </p:pic>
-      <p:sp>
-        <p:nvSpPr>
-          <p:cNvPr id="10" name="Rectangle 9"/>
-          <p:cNvSpPr/>
-          <p:nvPr/>
-        </p:nvSpPr>
-        <p:spPr>
-          <a:xfrm>
-            <a:off x="-410707" y="349413"/>
-            <a:ext cx="5782492" cy="2629988"/>
-          </a:xfrm>
-          <a:prstGeom prst="rect">
-            <a:avLst/>
-          </a:prstGeom>
-        </p:spPr>
-        <p:style>
-          <a:lnRef idx="2">
-            <a:schemeClr val="accent1">
-              <a:shade val="50000"/>
-            </a:schemeClr>
-          </a:lnRef>
-          <a:fillRef idx="1">
-            <a:schemeClr val="accent1"/>
-          </a:fillRef>
-          <a:effectRef idx="0">
-            <a:schemeClr val="accent1"/>
-          </a:effectRef>
-          <a:fontRef idx="minor">
-            <a:schemeClr val="lt1"/>
-          </a:fontRef>
-        </p:style>
-        <p:txBody>
-          <a:bodyPr rtlCol="0" anchor="ctr"/>
-          <a:lstStyle/>
-          <a:p>
-            <a:pPr algn="ctr"/>
-            <a:r>
-              <a:rPr lang="en-US" dirty="0" smtClean="0"/>
-              <a:t>[BORDER];</a:t>
-            </a:r>
-          </a:p>
-          <a:p>
-            <a:pPr algn="ctr"/>
-            <a:r>
-              <a:rPr lang="en-US" dirty="0" smtClean="0"/>
-              <a:t>[MOVEABLE];</a:t>
-            </a:r>
-          </a:p>
-          <a:p>
-            <a:pPr algn="ctr"/>
-            <a:r>
-              <a:rPr lang="en-US" dirty="0" smtClean="0"/>
-              <a:t>[</a:t>
-            </a:r>
-            <a:r>
-              <a:rPr lang="en-US" dirty="0" err="1" smtClean="0"/>
-              <a:t>WASDMovement</a:t>
-            </a:r>
-            <a:r>
-              <a:rPr lang="en-US" dirty="0" smtClean="0"/>
-              <a:t>];</a:t>
-            </a:r>
-          </a:p>
-          <a:p>
-            <a:pPr algn="ctr"/>
-            <a:r>
-              <a:rPr lang="en-US" dirty="0"/>
-              <a:t>[NAME=test];</a:t>
-            </a:r>
-          </a:p>
-          <a:p>
-            <a:pPr algn="ctr"/>
-            <a:endParaRPr lang="en-US" dirty="0"/>
-          </a:p>
-        </p:txBody>
-      </p:sp>
     </p:spTree>
     <p:extLst>
       <p:ext uri="{BB962C8B-B14F-4D97-AF65-F5344CB8AC3E}">

</xml_diff>